<commit_message>
v2: added report, updated deck
</commit_message>
<xml_diff>
--- a/CCPS_706_Presentation.pptx
+++ b/CCPS_706_Presentation.pptx
@@ -110,6 +110,11 @@
       </a:defRPr>
     </a:lvl9pPr>
   </p:defaultTextStyle>
+  <p:extLst>
+    <p:ext uri="{EFAFB233-063F-42B5-8137-9DF3F51BA10A}">
+      <p15:sldGuideLst xmlns:p15="http://schemas.microsoft.com/office/powerpoint/2012/main"/>
+    </p:ext>
+  </p:extLst>
 </p:presentation>
 </file>
 
@@ -700,7 +705,7 @@
           <a:p>
             <a:fld id="{11EAACC7-3B3F-47D1-959A-EF58926E955E}" type="datetimeFigureOut">
               <a:rPr lang="en-US" smtClean="0"/>
-              <a:t>4/16/22</a:t>
+              <a:t>4/17/22</a:t>
             </a:fld>
             <a:endParaRPr lang="en-US"/>
           </a:p>
@@ -898,7 +903,7 @@
           <a:p>
             <a:fld id="{11EAACC7-3B3F-47D1-959A-EF58926E955E}" type="datetimeFigureOut">
               <a:rPr lang="en-US" smtClean="0"/>
-              <a:t>4/16/22</a:t>
+              <a:t>4/17/22</a:t>
             </a:fld>
             <a:endParaRPr lang="en-US"/>
           </a:p>
@@ -1106,7 +1111,7 @@
           <a:p>
             <a:fld id="{11EAACC7-3B3F-47D1-959A-EF58926E955E}" type="datetimeFigureOut">
               <a:rPr lang="en-US" smtClean="0"/>
-              <a:t>4/16/22</a:t>
+              <a:t>4/17/22</a:t>
             </a:fld>
             <a:endParaRPr lang="en-US"/>
           </a:p>
@@ -1335,7 +1340,7 @@
           <a:p>
             <a:fld id="{11EAACC7-3B3F-47D1-959A-EF58926E955E}" type="datetimeFigureOut">
               <a:rPr lang="en-US" smtClean="0"/>
-              <a:t>4/16/22</a:t>
+              <a:t>4/17/22</a:t>
             </a:fld>
             <a:endParaRPr lang="en-US" dirty="0"/>
           </a:p>
@@ -1610,7 +1615,7 @@
           <a:p>
             <a:fld id="{11EAACC7-3B3F-47D1-959A-EF58926E955E}" type="datetimeFigureOut">
               <a:rPr lang="en-US" smtClean="0"/>
-              <a:t>4/16/22</a:t>
+              <a:t>4/17/22</a:t>
             </a:fld>
             <a:endParaRPr lang="en-US"/>
           </a:p>
@@ -1876,7 +1881,7 @@
           <a:p>
             <a:fld id="{11EAACC7-3B3F-47D1-959A-EF58926E955E}" type="datetimeFigureOut">
               <a:rPr lang="en-US" smtClean="0"/>
-              <a:t>4/16/22</a:t>
+              <a:t>4/17/22</a:t>
             </a:fld>
             <a:endParaRPr lang="en-US"/>
           </a:p>
@@ -2293,7 +2298,7 @@
           <a:p>
             <a:fld id="{11EAACC7-3B3F-47D1-959A-EF58926E955E}" type="datetimeFigureOut">
               <a:rPr lang="en-US" smtClean="0"/>
-              <a:t>4/16/22</a:t>
+              <a:t>4/17/22</a:t>
             </a:fld>
             <a:endParaRPr lang="en-US"/>
           </a:p>
@@ -2434,7 +2439,7 @@
           <a:p>
             <a:fld id="{11EAACC7-3B3F-47D1-959A-EF58926E955E}" type="datetimeFigureOut">
               <a:rPr lang="en-US" smtClean="0"/>
-              <a:t>4/16/22</a:t>
+              <a:t>4/17/22</a:t>
             </a:fld>
             <a:endParaRPr lang="en-US"/>
           </a:p>
@@ -2547,7 +2552,7 @@
           <a:p>
             <a:fld id="{11EAACC7-3B3F-47D1-959A-EF58926E955E}" type="datetimeFigureOut">
               <a:rPr lang="en-US" smtClean="0"/>
-              <a:t>4/16/22</a:t>
+              <a:t>4/17/22</a:t>
             </a:fld>
             <a:endParaRPr lang="en-US"/>
           </a:p>
@@ -2858,7 +2863,7 @@
           <a:p>
             <a:fld id="{11EAACC7-3B3F-47D1-959A-EF58926E955E}" type="datetimeFigureOut">
               <a:rPr lang="en-US" smtClean="0"/>
-              <a:t>4/16/22</a:t>
+              <a:t>4/17/22</a:t>
             </a:fld>
             <a:endParaRPr lang="en-US"/>
           </a:p>
@@ -3149,7 +3154,7 @@
           <a:p>
             <a:fld id="{11EAACC7-3B3F-47D1-959A-EF58926E955E}" type="datetimeFigureOut">
               <a:rPr lang="en-US" smtClean="0"/>
-              <a:t>4/16/22</a:t>
+              <a:t>4/17/22</a:t>
             </a:fld>
             <a:endParaRPr lang="en-US"/>
           </a:p>
@@ -3706,7 +3711,7 @@
           <a:p>
             <a:fld id="{11EAACC7-3B3F-47D1-959A-EF58926E955E}" type="datetimeFigureOut">
               <a:rPr lang="en-US" smtClean="0"/>
-              <a:t>4/16/22</a:t>
+              <a:t>4/17/22</a:t>
             </a:fld>
             <a:endParaRPr lang="en-US"/>
           </a:p>
@@ -5365,7 +5370,7 @@
         <p:spPr>
           <a:xfrm>
             <a:off x="733079" y="3583578"/>
-            <a:ext cx="4093711" cy="1938992"/>
+            <a:ext cx="4093711" cy="2246769"/>
           </a:xfrm>
           <a:prstGeom prst="rect">
             <a:avLst/>
@@ -5394,7 +5399,7 @@
             </a:pPr>
             <a:r>
               <a:rPr lang="en-US" sz="2000" dirty="0"/>
-              <a:t>Toy example used to show complexity of connections to actual servers</a:t>
+              <a:t>Example used to show necessary considerations for connections to actual servers</a:t>
             </a:r>
           </a:p>
           <a:p>
@@ -5531,15 +5536,26 @@
             <a:pPr lvl="1"/>
             <a:r>
               <a:rPr lang="en-US" dirty="0"/>
+              <a:t>Consider using caching in files if the retrieved resource needs to be persistent</a:t>
+            </a:r>
+          </a:p>
+          <a:p>
+            <a:pPr lvl="1"/>
+            <a:r>
+              <a:rPr lang="en-US" dirty="0"/>
+              <a:t>Only hold records for a specific amount of time</a:t>
+            </a:r>
+          </a:p>
+          <a:p>
+            <a:pPr lvl="1"/>
+            <a:r>
+              <a:rPr lang="en-US" dirty="0"/>
               <a:t>Bypassing bot detection</a:t>
             </a:r>
           </a:p>
           <a:p>
             <a:pPr lvl="1"/>
-            <a:r>
-              <a:rPr lang="en-US" dirty="0"/>
-              <a:t>Consider using caching in files if the retrieved resource needs to be persistent</a:t>
-            </a:r>
+            <a:endParaRPr lang="en-US" dirty="0"/>
           </a:p>
           <a:p>
             <a:pPr lvl="1"/>

</xml_diff>

<commit_message>
v2: update report and presentation
</commit_message>
<xml_diff>
--- a/CCPS_706_Presentation.pptx
+++ b/CCPS_706_Presentation.pptx
@@ -200,7 +200,7 @@
           <a:p>
             <a:fld id="{3DE49AB1-F4F4-D940-A004-DB780FBFB964}" type="datetimeFigureOut">
               <a:rPr lang="en-US" smtClean="0"/>
-              <a:t>4/17/22</a:t>
+              <a:t>4/21/22</a:t>
             </a:fld>
             <a:endParaRPr lang="en-US"/>
           </a:p>
@@ -705,7 +705,7 @@
           <a:p>
             <a:fld id="{11EAACC7-3B3F-47D1-959A-EF58926E955E}" type="datetimeFigureOut">
               <a:rPr lang="en-US" smtClean="0"/>
-              <a:t>4/17/22</a:t>
+              <a:t>4/21/22</a:t>
             </a:fld>
             <a:endParaRPr lang="en-US"/>
           </a:p>
@@ -903,7 +903,7 @@
           <a:p>
             <a:fld id="{11EAACC7-3B3F-47D1-959A-EF58926E955E}" type="datetimeFigureOut">
               <a:rPr lang="en-US" smtClean="0"/>
-              <a:t>4/17/22</a:t>
+              <a:t>4/21/22</a:t>
             </a:fld>
             <a:endParaRPr lang="en-US"/>
           </a:p>
@@ -1111,7 +1111,7 @@
           <a:p>
             <a:fld id="{11EAACC7-3B3F-47D1-959A-EF58926E955E}" type="datetimeFigureOut">
               <a:rPr lang="en-US" smtClean="0"/>
-              <a:t>4/17/22</a:t>
+              <a:t>4/21/22</a:t>
             </a:fld>
             <a:endParaRPr lang="en-US"/>
           </a:p>
@@ -1340,7 +1340,7 @@
           <a:p>
             <a:fld id="{11EAACC7-3B3F-47D1-959A-EF58926E955E}" type="datetimeFigureOut">
               <a:rPr lang="en-US" smtClean="0"/>
-              <a:t>4/17/22</a:t>
+              <a:t>4/21/22</a:t>
             </a:fld>
             <a:endParaRPr lang="en-US" dirty="0"/>
           </a:p>
@@ -1615,7 +1615,7 @@
           <a:p>
             <a:fld id="{11EAACC7-3B3F-47D1-959A-EF58926E955E}" type="datetimeFigureOut">
               <a:rPr lang="en-US" smtClean="0"/>
-              <a:t>4/17/22</a:t>
+              <a:t>4/21/22</a:t>
             </a:fld>
             <a:endParaRPr lang="en-US"/>
           </a:p>
@@ -1881,7 +1881,7 @@
           <a:p>
             <a:fld id="{11EAACC7-3B3F-47D1-959A-EF58926E955E}" type="datetimeFigureOut">
               <a:rPr lang="en-US" smtClean="0"/>
-              <a:t>4/17/22</a:t>
+              <a:t>4/21/22</a:t>
             </a:fld>
             <a:endParaRPr lang="en-US"/>
           </a:p>
@@ -2298,7 +2298,7 @@
           <a:p>
             <a:fld id="{11EAACC7-3B3F-47D1-959A-EF58926E955E}" type="datetimeFigureOut">
               <a:rPr lang="en-US" smtClean="0"/>
-              <a:t>4/17/22</a:t>
+              <a:t>4/21/22</a:t>
             </a:fld>
             <a:endParaRPr lang="en-US"/>
           </a:p>
@@ -2439,7 +2439,7 @@
           <a:p>
             <a:fld id="{11EAACC7-3B3F-47D1-959A-EF58926E955E}" type="datetimeFigureOut">
               <a:rPr lang="en-US" smtClean="0"/>
-              <a:t>4/17/22</a:t>
+              <a:t>4/21/22</a:t>
             </a:fld>
             <a:endParaRPr lang="en-US"/>
           </a:p>
@@ -2552,7 +2552,7 @@
           <a:p>
             <a:fld id="{11EAACC7-3B3F-47D1-959A-EF58926E955E}" type="datetimeFigureOut">
               <a:rPr lang="en-US" smtClean="0"/>
-              <a:t>4/17/22</a:t>
+              <a:t>4/21/22</a:t>
             </a:fld>
             <a:endParaRPr lang="en-US"/>
           </a:p>
@@ -2863,7 +2863,7 @@
           <a:p>
             <a:fld id="{11EAACC7-3B3F-47D1-959A-EF58926E955E}" type="datetimeFigureOut">
               <a:rPr lang="en-US" smtClean="0"/>
-              <a:t>4/17/22</a:t>
+              <a:t>4/21/22</a:t>
             </a:fld>
             <a:endParaRPr lang="en-US"/>
           </a:p>
@@ -3154,7 +3154,7 @@
           <a:p>
             <a:fld id="{11EAACC7-3B3F-47D1-959A-EF58926E955E}" type="datetimeFigureOut">
               <a:rPr lang="en-US" smtClean="0"/>
-              <a:t>4/17/22</a:t>
+              <a:t>4/21/22</a:t>
             </a:fld>
             <a:endParaRPr lang="en-US"/>
           </a:p>
@@ -3711,7 +3711,7 @@
           <a:p>
             <a:fld id="{11EAACC7-3B3F-47D1-959A-EF58926E955E}" type="datetimeFigureOut">
               <a:rPr lang="en-US" smtClean="0"/>
-              <a:t>4/17/22</a:t>
+              <a:t>4/21/22</a:t>
             </a:fld>
             <a:endParaRPr lang="en-US"/>
           </a:p>
@@ -4237,7 +4237,7 @@
         </p:nvSpPr>
         <p:spPr>
           <a:xfrm>
-            <a:off x="1104898" y="2122731"/>
+            <a:off x="1083205" y="1074947"/>
             <a:ext cx="5396110" cy="2664623"/>
           </a:xfrm>
         </p:spPr>
@@ -4273,8 +4273,8 @@
         </p:nvSpPr>
         <p:spPr>
           <a:xfrm>
-            <a:off x="1104899" y="1589470"/>
-            <a:ext cx="5916873" cy="1066522"/>
+            <a:off x="2119903" y="4218666"/>
+            <a:ext cx="5916873" cy="476189"/>
           </a:xfrm>
         </p:spPr>
         <p:txBody>
@@ -4286,8 +4286,12 @@
             <a:pPr algn="l"/>
             <a:r>
               <a:rPr lang="en-US" dirty="0"/>
-              <a:t>Arsalan Khuwaja &amp; Jacob Lam</a:t>
-            </a:r>
+              <a:t>Arsalan Khuwaja</a:t>
+            </a:r>
+          </a:p>
+          <a:p>
+            <a:pPr algn="l"/>
+            <a:endParaRPr lang="en-US" dirty="0"/>
           </a:p>
         </p:txBody>
       </p:sp>
@@ -4449,6 +4453,333 @@
           </a:fontRef>
         </p:style>
       </p:cxnSp>
+      <p:sp>
+        <p:nvSpPr>
+          <p:cNvPr id="5" name="AutoShape 2">
+            <a:extLst>
+              <a:ext uri="{FF2B5EF4-FFF2-40B4-BE49-F238E27FC236}">
+                <a16:creationId xmlns:a16="http://schemas.microsoft.com/office/drawing/2014/main" id="{4FF08CF1-3750-4B42-82CA-08CC957E1A16}"/>
+              </a:ext>
+            </a:extLst>
+          </p:cNvPr>
+          <p:cNvSpPr>
+            <a:spLocks noChangeAspect="1" noChangeArrowheads="1"/>
+          </p:cNvSpPr>
+          <p:nvPr/>
+        </p:nvSpPr>
+        <p:spPr bwMode="auto">
+          <a:xfrm>
+            <a:off x="6159958" y="3492958"/>
+            <a:ext cx="88442" cy="88442"/>
+          </a:xfrm>
+          <a:prstGeom prst="rect">
+            <a:avLst/>
+          </a:prstGeom>
+          <a:noFill/>
+          <a:extLst>
+            <a:ext uri="{909E8E84-426E-40DD-AFC4-6F175D3DCCD1}">
+              <a14:hiddenFill xmlns:a14="http://schemas.microsoft.com/office/drawing/2010/main">
+                <a:solidFill>
+                  <a:srgbClr val="FFFFFF"/>
+                </a:solidFill>
+              </a14:hiddenFill>
+            </a:ext>
+          </a:extLst>
+        </p:spPr>
+        <p:txBody>
+          <a:bodyPr vert="horz" wrap="square" lIns="91440" tIns="45720" rIns="91440" bIns="45720" numCol="1" anchor="t" anchorCtr="0" compatLnSpc="1">
+            <a:prstTxWarp prst="textNoShape">
+              <a:avLst/>
+            </a:prstTxWarp>
+          </a:bodyPr>
+          <a:lstStyle/>
+          <a:p>
+            <a:endParaRPr lang="en-US"/>
+          </a:p>
+        </p:txBody>
+      </p:sp>
+      <p:pic>
+        <p:nvPicPr>
+          <p:cNvPr id="1030" name="Picture 6" descr="Jacob Lam">
+            <a:extLst>
+              <a:ext uri="{FF2B5EF4-FFF2-40B4-BE49-F238E27FC236}">
+                <a16:creationId xmlns:a16="http://schemas.microsoft.com/office/drawing/2014/main" id="{CEC5281A-E68F-2F43-B9B5-B612C61DEC94}"/>
+              </a:ext>
+            </a:extLst>
+          </p:cNvPr>
+          <p:cNvPicPr>
+            <a:picLocks noChangeAspect="1" noChangeArrowheads="1"/>
+          </p:cNvPicPr>
+          <p:nvPr/>
+        </p:nvPicPr>
+        <p:blipFill>
+          <a:blip r:embed="rId3">
+            <a:extLst>
+              <a:ext uri="{28A0092B-C50C-407E-A947-70E740481C1C}">
+                <a14:useLocalDpi xmlns:a14="http://schemas.microsoft.com/office/drawing/2010/main" val="0"/>
+              </a:ext>
+            </a:extLst>
+          </a:blip>
+          <a:srcRect/>
+          <a:stretch>
+            <a:fillRect/>
+          </a:stretch>
+        </p:blipFill>
+        <p:spPr bwMode="auto">
+          <a:xfrm>
+            <a:off x="1154408" y="4967844"/>
+            <a:ext cx="965495" cy="965495"/>
+          </a:xfrm>
+          <a:prstGeom prst="rect">
+            <a:avLst/>
+          </a:prstGeom>
+          <a:noFill/>
+          <a:extLst>
+            <a:ext uri="{909E8E84-426E-40DD-AFC4-6F175D3DCCD1}">
+              <a14:hiddenFill xmlns:a14="http://schemas.microsoft.com/office/drawing/2010/main">
+                <a:solidFill>
+                  <a:srgbClr val="FFFFFF"/>
+                </a:solidFill>
+              </a14:hiddenFill>
+            </a:ext>
+          </a:extLst>
+        </p:spPr>
+      </p:pic>
+      <p:pic>
+        <p:nvPicPr>
+          <p:cNvPr id="8" name="Picture 7">
+            <a:extLst>
+              <a:ext uri="{FF2B5EF4-FFF2-40B4-BE49-F238E27FC236}">
+                <a16:creationId xmlns:a16="http://schemas.microsoft.com/office/drawing/2014/main" id="{13A79CDE-985A-7B49-B0EA-52978B98263D}"/>
+              </a:ext>
+            </a:extLst>
+          </p:cNvPr>
+          <p:cNvPicPr>
+            <a:picLocks noChangeAspect="1"/>
+          </p:cNvPicPr>
+          <p:nvPr/>
+        </p:nvPicPr>
+        <p:blipFill>
+          <a:blip r:embed="rId4"/>
+          <a:stretch>
+            <a:fillRect/>
+          </a:stretch>
+        </p:blipFill>
+        <p:spPr>
+          <a:xfrm>
+            <a:off x="1154408" y="3843518"/>
+            <a:ext cx="894290" cy="1066523"/>
+          </a:xfrm>
+          <a:prstGeom prst="rect">
+            <a:avLst/>
+          </a:prstGeom>
+        </p:spPr>
+      </p:pic>
+      <p:sp>
+        <p:nvSpPr>
+          <p:cNvPr id="14" name="Subtitle 2">
+            <a:extLst>
+              <a:ext uri="{FF2B5EF4-FFF2-40B4-BE49-F238E27FC236}">
+                <a16:creationId xmlns:a16="http://schemas.microsoft.com/office/drawing/2014/main" id="{5324B530-AC86-884B-A399-D286C84666EE}"/>
+              </a:ext>
+            </a:extLst>
+          </p:cNvPr>
+          <p:cNvSpPr txBox="1">
+            <a:spLocks/>
+          </p:cNvSpPr>
+          <p:nvPr/>
+        </p:nvSpPr>
+        <p:spPr>
+          <a:xfrm>
+            <a:off x="2191108" y="5271809"/>
+            <a:ext cx="5916873" cy="661530"/>
+          </a:xfrm>
+          <a:prstGeom prst="rect">
+            <a:avLst/>
+          </a:prstGeom>
+        </p:spPr>
+        <p:txBody>
+          <a:bodyPr vert="horz" lIns="91440" tIns="45720" rIns="91440" bIns="45720" rtlCol="0">
+            <a:normAutofit/>
+          </a:bodyPr>
+          <a:lstStyle>
+            <a:lvl1pPr marL="0" indent="0" algn="ctr" defTabSz="914400" rtl="0" eaLnBrk="1" latinLnBrk="0" hangingPunct="1">
+              <a:lnSpc>
+                <a:spcPct val="120000"/>
+              </a:lnSpc>
+              <a:spcBef>
+                <a:spcPts val="1000"/>
+              </a:spcBef>
+              <a:buSzPct val="80000"/>
+              <a:buFont typeface="Arial" panose="020B0604020202020204" pitchFamily="34" charset="0"/>
+              <a:buNone/>
+              <a:defRPr sz="1800" b="1" kern="1200" cap="all" spc="300" baseline="0">
+                <a:solidFill>
+                  <a:schemeClr val="tx2"/>
+                </a:solidFill>
+                <a:latin typeface="+mn-lt"/>
+                <a:ea typeface="+mn-ea"/>
+                <a:cs typeface="+mn-cs"/>
+              </a:defRPr>
+            </a:lvl1pPr>
+            <a:lvl2pPr marL="457200" indent="0" algn="ctr" defTabSz="914400" rtl="0" eaLnBrk="1" latinLnBrk="0" hangingPunct="1">
+              <a:lnSpc>
+                <a:spcPct val="100000"/>
+              </a:lnSpc>
+              <a:spcBef>
+                <a:spcPts val="500"/>
+              </a:spcBef>
+              <a:buSzPct val="80000"/>
+              <a:buFont typeface="Arial" panose="020B0604020202020204" pitchFamily="34" charset="0"/>
+              <a:buNone/>
+              <a:defRPr sz="2000" kern="1200">
+                <a:solidFill>
+                  <a:schemeClr val="tx2"/>
+                </a:solidFill>
+                <a:latin typeface="+mn-lt"/>
+                <a:ea typeface="+mn-ea"/>
+                <a:cs typeface="+mn-cs"/>
+              </a:defRPr>
+            </a:lvl2pPr>
+            <a:lvl3pPr marL="914400" indent="0" algn="ctr" defTabSz="914400" rtl="0" eaLnBrk="1" latinLnBrk="0" hangingPunct="1">
+              <a:lnSpc>
+                <a:spcPct val="100000"/>
+              </a:lnSpc>
+              <a:spcBef>
+                <a:spcPts val="500"/>
+              </a:spcBef>
+              <a:buSzPct val="80000"/>
+              <a:buFont typeface="Arial" panose="020B0604020202020204" pitchFamily="34" charset="0"/>
+              <a:buNone/>
+              <a:defRPr sz="1800" kern="1200">
+                <a:solidFill>
+                  <a:schemeClr val="tx2"/>
+                </a:solidFill>
+                <a:latin typeface="+mn-lt"/>
+                <a:ea typeface="+mn-ea"/>
+                <a:cs typeface="+mn-cs"/>
+              </a:defRPr>
+            </a:lvl3pPr>
+            <a:lvl4pPr marL="1371600" indent="0" algn="ctr" defTabSz="914400" rtl="0" eaLnBrk="1" latinLnBrk="0" hangingPunct="1">
+              <a:lnSpc>
+                <a:spcPct val="100000"/>
+              </a:lnSpc>
+              <a:spcBef>
+                <a:spcPts val="500"/>
+              </a:spcBef>
+              <a:buSzPct val="80000"/>
+              <a:buFont typeface="Arial" panose="020B0604020202020204" pitchFamily="34" charset="0"/>
+              <a:buNone/>
+              <a:defRPr sz="1600" kern="1200">
+                <a:solidFill>
+                  <a:schemeClr val="tx2"/>
+                </a:solidFill>
+                <a:latin typeface="+mn-lt"/>
+                <a:ea typeface="+mn-ea"/>
+                <a:cs typeface="+mn-cs"/>
+              </a:defRPr>
+            </a:lvl4pPr>
+            <a:lvl5pPr marL="1828800" indent="0" algn="ctr" defTabSz="914400" rtl="0" eaLnBrk="1" latinLnBrk="0" hangingPunct="1">
+              <a:lnSpc>
+                <a:spcPct val="100000"/>
+              </a:lnSpc>
+              <a:spcBef>
+                <a:spcPts val="500"/>
+              </a:spcBef>
+              <a:buSzPct val="80000"/>
+              <a:buFont typeface="Arial" panose="020B0604020202020204" pitchFamily="34" charset="0"/>
+              <a:buNone/>
+              <a:defRPr sz="1600" kern="1200">
+                <a:solidFill>
+                  <a:schemeClr val="tx2"/>
+                </a:solidFill>
+                <a:latin typeface="+mn-lt"/>
+                <a:ea typeface="+mn-ea"/>
+                <a:cs typeface="+mn-cs"/>
+              </a:defRPr>
+            </a:lvl5pPr>
+            <a:lvl6pPr marL="2286000" indent="0" algn="ctr" defTabSz="914400" rtl="0" eaLnBrk="1" latinLnBrk="0" hangingPunct="1">
+              <a:lnSpc>
+                <a:spcPct val="90000"/>
+              </a:lnSpc>
+              <a:spcBef>
+                <a:spcPts val="500"/>
+              </a:spcBef>
+              <a:buFont typeface="Arial" panose="020B0604020202020204" pitchFamily="34" charset="0"/>
+              <a:buNone/>
+              <a:defRPr sz="1600" kern="1200">
+                <a:solidFill>
+                  <a:schemeClr val="tx1"/>
+                </a:solidFill>
+                <a:latin typeface="+mn-lt"/>
+                <a:ea typeface="+mn-ea"/>
+                <a:cs typeface="+mn-cs"/>
+              </a:defRPr>
+            </a:lvl6pPr>
+            <a:lvl7pPr marL="2743200" indent="0" algn="ctr" defTabSz="914400" rtl="0" eaLnBrk="1" latinLnBrk="0" hangingPunct="1">
+              <a:lnSpc>
+                <a:spcPct val="90000"/>
+              </a:lnSpc>
+              <a:spcBef>
+                <a:spcPts val="500"/>
+              </a:spcBef>
+              <a:buFont typeface="Arial" panose="020B0604020202020204" pitchFamily="34" charset="0"/>
+              <a:buNone/>
+              <a:defRPr sz="1600" kern="1200">
+                <a:solidFill>
+                  <a:schemeClr val="tx1"/>
+                </a:solidFill>
+                <a:latin typeface="+mn-lt"/>
+                <a:ea typeface="+mn-ea"/>
+                <a:cs typeface="+mn-cs"/>
+              </a:defRPr>
+            </a:lvl7pPr>
+            <a:lvl8pPr marL="3200400" indent="0" algn="ctr" defTabSz="914400" rtl="0" eaLnBrk="1" latinLnBrk="0" hangingPunct="1">
+              <a:lnSpc>
+                <a:spcPct val="90000"/>
+              </a:lnSpc>
+              <a:spcBef>
+                <a:spcPts val="500"/>
+              </a:spcBef>
+              <a:buFont typeface="Arial" panose="020B0604020202020204" pitchFamily="34" charset="0"/>
+              <a:buNone/>
+              <a:defRPr sz="1600" kern="1200">
+                <a:solidFill>
+                  <a:schemeClr val="tx1"/>
+                </a:solidFill>
+                <a:latin typeface="+mn-lt"/>
+                <a:ea typeface="+mn-ea"/>
+                <a:cs typeface="+mn-cs"/>
+              </a:defRPr>
+            </a:lvl8pPr>
+            <a:lvl9pPr marL="3657600" indent="0" algn="ctr" defTabSz="914400" rtl="0" eaLnBrk="1" latinLnBrk="0" hangingPunct="1">
+              <a:lnSpc>
+                <a:spcPct val="90000"/>
+              </a:lnSpc>
+              <a:spcBef>
+                <a:spcPts val="500"/>
+              </a:spcBef>
+              <a:buFont typeface="Arial" panose="020B0604020202020204" pitchFamily="34" charset="0"/>
+              <a:buNone/>
+              <a:defRPr sz="1600" kern="1200">
+                <a:solidFill>
+                  <a:schemeClr val="tx1"/>
+                </a:solidFill>
+                <a:latin typeface="+mn-lt"/>
+                <a:ea typeface="+mn-ea"/>
+                <a:cs typeface="+mn-cs"/>
+              </a:defRPr>
+            </a:lvl9pPr>
+          </a:lstStyle>
+          <a:p>
+            <a:pPr algn="l"/>
+            <a:r>
+              <a:rPr lang="en-US" dirty="0"/>
+              <a:t>Jacob LAM</a:t>
+            </a:r>
+          </a:p>
+        </p:txBody>
+      </p:sp>
     </p:spTree>
     <p:extLst>
       <p:ext uri="{BB962C8B-B14F-4D97-AF65-F5344CB8AC3E}">

</xml_diff>